<commit_message>
Final version of the poster
</commit_message>
<xml_diff>
--- a/Poster/Poster-AloysioGalvaoLopes.pptx
+++ b/Poster/Poster-AloysioGalvaoLopes.pptx
@@ -3460,7 +3460,7 @@
         <p:spPr>
           <a:xfrm>
             <a:off x="2158598" y="21733849"/>
-            <a:ext cx="15545688" cy="2518482"/>
+            <a:ext cx="15545688" cy="3004916"/>
           </a:xfrm>
           <a:prstGeom prst="rect">
             <a:avLst/>
@@ -3481,7 +3481,15 @@
             <a:pPr algn="just"/>
             <a:r>
               <a:rPr lang="en-US" sz="3091" dirty="0" smtClean="0"/>
-              <a:t>A Figura 1 o </a:t>
+              <a:t>     A Figura 1 </a:t>
+            </a:r>
+            <a:r>
+              <a:rPr lang="en-US" sz="3091" dirty="0" err="1" smtClean="0"/>
+              <a:t>mostra</a:t>
+            </a:r>
+            <a:r>
+              <a:rPr lang="en-US" sz="3091" dirty="0" smtClean="0"/>
+              <a:t> o </a:t>
             </a:r>
             <a:r>
               <a:rPr lang="en-US" sz="3091" dirty="0" err="1" smtClean="0"/>
@@ -3513,15 +3521,195 @@
             </a:r>
             <a:r>
               <a:rPr lang="en-US" sz="3091" dirty="0" smtClean="0"/>
-              <a:t>, a planta do motor. A Figura 2 </a:t>
+              <a:t>, a planta do motor. A Figura 2 ilustra o </a:t>
+            </a:r>
+            <a:r>
+              <a:rPr lang="en-US" sz="3091" dirty="0" err="1" smtClean="0"/>
+              <a:t>diagrama</a:t>
+            </a:r>
+            <a:r>
+              <a:rPr lang="en-US" sz="3091" dirty="0" smtClean="0"/>
+              <a:t> de bode do </a:t>
+            </a:r>
+            <a:r>
+              <a:rPr lang="en-US" sz="3091" dirty="0" err="1" smtClean="0"/>
+              <a:t>sistema</a:t>
+            </a:r>
+            <a:r>
+              <a:rPr lang="en-US" sz="3091" dirty="0" smtClean="0"/>
+              <a:t> e a Figura 3 </a:t>
             </a:r>
             <a:r>
               <a:rPr lang="en-US" sz="3091" dirty="0" err="1" smtClean="0"/>
               <a:t>mostra</a:t>
             </a:r>
             <a:r>
+              <a:rPr lang="en-US" sz="3091" dirty="0"/>
+              <a:t> </a:t>
+            </a:r>
+            <a:r>
               <a:rPr lang="en-US" sz="3091" dirty="0" smtClean="0"/>
-              <a:t> o diagram de bode do </a:t>
+              <a:t>a </a:t>
+            </a:r>
+            <a:r>
+              <a:rPr lang="en-US" sz="3091" dirty="0" err="1" smtClean="0"/>
+              <a:t>resposta</a:t>
+            </a:r>
+            <a:r>
+              <a:rPr lang="en-US" sz="3091" dirty="0" smtClean="0"/>
+              <a:t> </a:t>
+            </a:r>
+            <a:r>
+              <a:rPr lang="en-US" sz="3091" dirty="0" err="1" smtClean="0"/>
+              <a:t>em</a:t>
+            </a:r>
+            <a:r>
+              <a:rPr lang="en-US" sz="3091" dirty="0" smtClean="0"/>
+              <a:t> </a:t>
+            </a:r>
+            <a:r>
+              <a:rPr lang="en-US" sz="3091" dirty="0" err="1" smtClean="0"/>
+              <a:t>degrau</a:t>
+            </a:r>
+            <a:r>
+              <a:rPr lang="en-US" sz="3091" dirty="0" smtClean="0"/>
+              <a:t> </a:t>
+            </a:r>
+            <a:r>
+              <a:rPr lang="en-US" sz="3091" dirty="0" err="1" smtClean="0"/>
+              <a:t>unitário</a:t>
+            </a:r>
+            <a:r>
+              <a:rPr lang="en-US" sz="3091" dirty="0" smtClean="0"/>
+              <a:t> do Sistema </a:t>
+            </a:r>
+            <a:r>
+              <a:rPr lang="en-US" sz="3091" dirty="0" err="1" smtClean="0"/>
+              <a:t>analisado</a:t>
+            </a:r>
+            <a:r>
+              <a:rPr lang="en-US" sz="3091" dirty="0" smtClean="0"/>
+              <a:t>. A Figura 4 </a:t>
+            </a:r>
+            <a:r>
+              <a:rPr lang="en-US" sz="3091" dirty="0" err="1" smtClean="0"/>
+              <a:t>mostra</a:t>
+            </a:r>
+            <a:r>
+              <a:rPr lang="en-US" sz="3091" dirty="0" smtClean="0"/>
+              <a:t> o </a:t>
+            </a:r>
+            <a:r>
+              <a:rPr lang="en-US" sz="3091" dirty="0" err="1" smtClean="0"/>
+              <a:t>primeiro</a:t>
+            </a:r>
+            <a:r>
+              <a:rPr lang="en-US" sz="3091" dirty="0" smtClean="0"/>
+              <a:t> </a:t>
+            </a:r>
+            <a:r>
+              <a:rPr lang="en-US" sz="3091" dirty="0" err="1" smtClean="0"/>
+              <a:t>protótipo</a:t>
+            </a:r>
+            <a:r>
+              <a:rPr lang="en-US" sz="3091" dirty="0" smtClean="0"/>
+              <a:t> do </a:t>
+            </a:r>
+            <a:r>
+              <a:rPr lang="en-US" sz="3091" dirty="0" err="1" smtClean="0"/>
+              <a:t>robô</a:t>
+            </a:r>
+            <a:r>
+              <a:rPr lang="en-US" sz="3091" dirty="0" smtClean="0"/>
+              <a:t> </a:t>
+            </a:r>
+            <a:r>
+              <a:rPr lang="en-US" sz="3091" dirty="0" err="1" smtClean="0"/>
+              <a:t>montado</a:t>
+            </a:r>
+            <a:r>
+              <a:rPr lang="en-US" sz="3091" dirty="0" smtClean="0"/>
+              <a:t> com </a:t>
+            </a:r>
+            <a:r>
+              <a:rPr lang="en-US" sz="3091" dirty="0" err="1" smtClean="0"/>
+              <a:t>quatro</a:t>
+            </a:r>
+            <a:r>
+              <a:rPr lang="en-US" sz="3091" dirty="0" smtClean="0"/>
+              <a:t> </a:t>
+            </a:r>
+            <a:r>
+              <a:rPr lang="en-US" sz="3091" dirty="0" err="1" smtClean="0"/>
+              <a:t>motores</a:t>
+            </a:r>
+            <a:r>
+              <a:rPr lang="en-US" sz="3091" dirty="0" smtClean="0"/>
+              <a:t>. </a:t>
+            </a:r>
+            <a:r>
+              <a:rPr lang="en-US" sz="3091" dirty="0" err="1" smtClean="0"/>
+              <a:t>Ressalta</a:t>
+            </a:r>
+            <a:r>
+              <a:rPr lang="en-US" sz="3091" dirty="0" smtClean="0"/>
+              <a:t>-se que o </a:t>
+            </a:r>
+            <a:r>
+              <a:rPr lang="en-US" sz="3091" dirty="0" err="1" smtClean="0"/>
+              <a:t>próximo</a:t>
+            </a:r>
+            <a:r>
+              <a:rPr lang="en-US" sz="3091" dirty="0" smtClean="0"/>
+              <a:t> </a:t>
+            </a:r>
+            <a:r>
+              <a:rPr lang="en-US" sz="3091" dirty="0" err="1" smtClean="0"/>
+              <a:t>passo</a:t>
+            </a:r>
+            <a:r>
+              <a:rPr lang="en-US" sz="3091" dirty="0" smtClean="0"/>
+              <a:t> </a:t>
+            </a:r>
+            <a:r>
+              <a:rPr lang="en-US" sz="3091" dirty="0" err="1" smtClean="0"/>
+              <a:t>deste</a:t>
+            </a:r>
+            <a:r>
+              <a:rPr lang="en-US" sz="3091" dirty="0" smtClean="0"/>
+              <a:t> </a:t>
+            </a:r>
+            <a:r>
+              <a:rPr lang="en-US" sz="3091" dirty="0" err="1" smtClean="0"/>
+              <a:t>projeto</a:t>
+            </a:r>
+            <a:r>
+              <a:rPr lang="en-US" sz="3091" dirty="0" smtClean="0"/>
+              <a:t> é </a:t>
+            </a:r>
+            <a:r>
+              <a:rPr lang="en-US" sz="3091" dirty="0" err="1" smtClean="0"/>
+              <a:t>implementar</a:t>
+            </a:r>
+            <a:r>
+              <a:rPr lang="en-US" sz="3091" dirty="0" smtClean="0"/>
+              <a:t> o </a:t>
+            </a:r>
+            <a:r>
+              <a:rPr lang="en-US" sz="3091" dirty="0" err="1" smtClean="0"/>
+              <a:t>controlador</a:t>
+            </a:r>
+            <a:r>
+              <a:rPr lang="en-US" sz="3091" dirty="0" smtClean="0"/>
+              <a:t> </a:t>
+            </a:r>
+            <a:r>
+              <a:rPr lang="en-US" sz="3091" dirty="0" err="1" smtClean="0"/>
+              <a:t>desenvolvido</a:t>
+            </a:r>
+            <a:r>
+              <a:rPr lang="en-US" sz="3091" dirty="0" smtClean="0"/>
+              <a:t> no </a:t>
             </a:r>
             <a:r>
               <a:rPr lang="en-US" sz="3091" dirty="0" err="1" smtClean="0"/>
@@ -3529,25 +3717,13 @@
             </a:r>
             <a:r>
               <a:rPr lang="en-US" sz="3091" dirty="0" smtClean="0"/>
-              <a:t> e a Figura 3 </a:t>
+              <a:t> real. A Figura 5 </a:t>
             </a:r>
             <a:r>
               <a:rPr lang="en-US" sz="3091" dirty="0" err="1" smtClean="0"/>
               <a:t>mostra</a:t>
             </a:r>
             <a:r>
-              <a:rPr lang="en-US" sz="3091" dirty="0"/>
-              <a:t> </a:t>
-            </a:r>
-            <a:r>
-              <a:rPr lang="en-US" sz="3091" dirty="0" smtClean="0"/>
-              <a:t>a </a:t>
-            </a:r>
-            <a:r>
-              <a:rPr lang="en-US" sz="3091" dirty="0" err="1" smtClean="0"/>
-              <a:t>resposta</a:t>
-            </a:r>
-            <a:r>
               <a:rPr lang="en-US" sz="3091" dirty="0" smtClean="0"/>
               <a:t> </a:t>
             </a:r>
@@ -3561,31 +3737,7 @@
             </a:r>
             <a:r>
               <a:rPr lang="en-US" sz="3091" dirty="0" err="1" smtClean="0"/>
-              <a:t>degrau</a:t>
-            </a:r>
-            <a:r>
-              <a:rPr lang="en-US" sz="3091" dirty="0" smtClean="0"/>
-              <a:t> do Sistema </a:t>
-            </a:r>
-            <a:r>
-              <a:rPr lang="en-US" sz="3091" dirty="0" err="1" smtClean="0"/>
-              <a:t>analisado</a:t>
-            </a:r>
-            <a:r>
-              <a:rPr lang="en-US" sz="3091" dirty="0" smtClean="0"/>
-              <a:t>. A Figura 4 </a:t>
-            </a:r>
-            <a:r>
-              <a:rPr lang="en-US" sz="3091" dirty="0" err="1" smtClean="0"/>
-              <a:t>mostra</a:t>
-            </a:r>
-            <a:r>
-              <a:rPr lang="en-US" sz="3091" dirty="0" smtClean="0"/>
-              <a:t> o </a:t>
-            </a:r>
-            <a:r>
-              <a:rPr lang="en-US" sz="3091" dirty="0" err="1" smtClean="0"/>
-              <a:t>o</a:t>
+              <a:t>maior</a:t>
             </a:r>
             <a:r>
               <a:rPr lang="en-US" sz="3091" dirty="0" smtClean="0"/>
@@ -3593,7 +3745,15 @@
             </a:r>
             <a:r>
               <a:rPr lang="en-US" sz="3091" dirty="0" err="1" smtClean="0"/>
-              <a:t>primeiro</a:t>
+              <a:t>detalhe</a:t>
+            </a:r>
+            <a:r>
+              <a:rPr lang="en-US" sz="3091" dirty="0" smtClean="0"/>
+              <a:t> o motor </a:t>
+            </a:r>
+            <a:r>
+              <a:rPr lang="en-US" sz="3091" dirty="0" err="1" smtClean="0"/>
+              <a:t>elétrico</a:t>
             </a:r>
             <a:r>
               <a:rPr lang="en-US" sz="3091" dirty="0" smtClean="0"/>
@@ -3601,15 +3761,7 @@
             </a:r>
             <a:r>
               <a:rPr lang="en-US" sz="3091" dirty="0" err="1" smtClean="0"/>
-              <a:t>protótipo</a:t>
-            </a:r>
-            <a:r>
-              <a:rPr lang="en-US" sz="3091" dirty="0" smtClean="0"/>
-              <a:t> do </a:t>
-            </a:r>
-            <a:r>
-              <a:rPr lang="en-US" sz="3091" dirty="0" err="1" smtClean="0"/>
-              <a:t>robô</a:t>
+              <a:t>utilizado</a:t>
             </a:r>
             <a:r>
               <a:rPr lang="en-US" sz="3091" dirty="0" smtClean="0"/>
@@ -3617,15 +3769,7 @@
             </a:r>
             <a:r>
               <a:rPr lang="en-US" sz="3091" dirty="0" err="1" smtClean="0"/>
-              <a:t>montado</a:t>
-            </a:r>
-            <a:r>
-              <a:rPr lang="en-US" sz="3091" dirty="0" smtClean="0"/>
-              <a:t> com </a:t>
-            </a:r>
-            <a:r>
-              <a:rPr lang="en-US" sz="3091" dirty="0" err="1" smtClean="0"/>
-              <a:t>quatro</a:t>
+              <a:t>neste</a:t>
             </a:r>
             <a:r>
               <a:rPr lang="en-US" sz="3091" dirty="0" smtClean="0"/>
@@ -3633,142 +3777,6 @@
             </a:r>
             <a:r>
               <a:rPr lang="en-US" sz="3091" dirty="0" err="1" smtClean="0"/>
-              <a:t>motores</a:t>
-            </a:r>
-            <a:r>
-              <a:rPr lang="en-US" sz="3091" dirty="0" smtClean="0"/>
-              <a:t>. </a:t>
-            </a:r>
-            <a:r>
-              <a:rPr lang="en-US" sz="3091" dirty="0" err="1" smtClean="0"/>
-              <a:t>Ressalta</a:t>
-            </a:r>
-            <a:r>
-              <a:rPr lang="en-US" sz="3091" dirty="0" smtClean="0"/>
-              <a:t>-se que o </a:t>
-            </a:r>
-            <a:r>
-              <a:rPr lang="en-US" sz="3091" dirty="0" err="1" smtClean="0"/>
-              <a:t>próximo</a:t>
-            </a:r>
-            <a:r>
-              <a:rPr lang="en-US" sz="3091" dirty="0" smtClean="0"/>
-              <a:t> </a:t>
-            </a:r>
-            <a:r>
-              <a:rPr lang="en-US" sz="3091" dirty="0" err="1" smtClean="0"/>
-              <a:t>passo</a:t>
-            </a:r>
-            <a:r>
-              <a:rPr lang="en-US" sz="3091" dirty="0" smtClean="0"/>
-              <a:t> </a:t>
-            </a:r>
-            <a:r>
-              <a:rPr lang="en-US" sz="3091" dirty="0" err="1" smtClean="0"/>
-              <a:t>deste</a:t>
-            </a:r>
-            <a:r>
-              <a:rPr lang="en-US" sz="3091" dirty="0" smtClean="0"/>
-              <a:t> </a:t>
-            </a:r>
-            <a:r>
-              <a:rPr lang="en-US" sz="3091" dirty="0" err="1" smtClean="0"/>
-              <a:t>projeto</a:t>
-            </a:r>
-            <a:r>
-              <a:rPr lang="en-US" sz="3091" dirty="0" smtClean="0"/>
-              <a:t> é </a:t>
-            </a:r>
-            <a:r>
-              <a:rPr lang="en-US" sz="3091" dirty="0" err="1" smtClean="0"/>
-              <a:t>implementar</a:t>
-            </a:r>
-            <a:r>
-              <a:rPr lang="en-US" sz="3091" dirty="0" smtClean="0"/>
-              <a:t> o </a:t>
-            </a:r>
-            <a:r>
-              <a:rPr lang="en-US" sz="3091" dirty="0" err="1" smtClean="0"/>
-              <a:t>controlador</a:t>
-            </a:r>
-            <a:r>
-              <a:rPr lang="en-US" sz="3091" dirty="0" smtClean="0"/>
-              <a:t> </a:t>
-            </a:r>
-            <a:r>
-              <a:rPr lang="en-US" sz="3091" dirty="0" err="1" smtClean="0"/>
-              <a:t>desenvolvido</a:t>
-            </a:r>
-            <a:r>
-              <a:rPr lang="en-US" sz="3091" dirty="0" smtClean="0"/>
-              <a:t> no </a:t>
-            </a:r>
-            <a:r>
-              <a:rPr lang="en-US" sz="3091" dirty="0" err="1" smtClean="0"/>
-              <a:t>sistema</a:t>
-            </a:r>
-            <a:r>
-              <a:rPr lang="en-US" sz="3091" dirty="0" smtClean="0"/>
-              <a:t> real. A Figura 5 </a:t>
-            </a:r>
-            <a:r>
-              <a:rPr lang="en-US" sz="3091" dirty="0" err="1" smtClean="0"/>
-              <a:t>mostra</a:t>
-            </a:r>
-            <a:r>
-              <a:rPr lang="en-US" sz="3091" dirty="0" smtClean="0"/>
-              <a:t> </a:t>
-            </a:r>
-            <a:r>
-              <a:rPr lang="en-US" sz="3091" dirty="0" err="1" smtClean="0"/>
-              <a:t>em</a:t>
-            </a:r>
-            <a:r>
-              <a:rPr lang="en-US" sz="3091" dirty="0" smtClean="0"/>
-              <a:t> </a:t>
-            </a:r>
-            <a:r>
-              <a:rPr lang="en-US" sz="3091" dirty="0" err="1" smtClean="0"/>
-              <a:t>maior</a:t>
-            </a:r>
-            <a:r>
-              <a:rPr lang="en-US" sz="3091" dirty="0" smtClean="0"/>
-              <a:t> </a:t>
-            </a:r>
-            <a:r>
-              <a:rPr lang="en-US" sz="3091" dirty="0" err="1" smtClean="0"/>
-              <a:t>detalhe</a:t>
-            </a:r>
-            <a:r>
-              <a:rPr lang="en-US" sz="3091" dirty="0" smtClean="0"/>
-              <a:t> o motor </a:t>
-            </a:r>
-            <a:r>
-              <a:rPr lang="en-US" sz="3091" dirty="0" err="1" smtClean="0"/>
-              <a:t>elétrico</a:t>
-            </a:r>
-            <a:r>
-              <a:rPr lang="en-US" sz="3091" dirty="0" smtClean="0"/>
-              <a:t> </a:t>
-            </a:r>
-            <a:r>
-              <a:rPr lang="en-US" sz="3091" dirty="0" err="1" smtClean="0"/>
-              <a:t>utilizado</a:t>
-            </a:r>
-            <a:r>
-              <a:rPr lang="en-US" sz="3091" dirty="0" smtClean="0"/>
-              <a:t> </a:t>
-            </a:r>
-            <a:r>
-              <a:rPr lang="en-US" sz="3091" dirty="0" err="1" smtClean="0"/>
-              <a:t>neste</a:t>
-            </a:r>
-            <a:r>
-              <a:rPr lang="en-US" sz="3091" dirty="0" smtClean="0"/>
-              <a:t> </a:t>
-            </a:r>
-            <a:r>
-              <a:rPr lang="en-US" sz="3091" dirty="0" err="1" smtClean="0"/>
               <a:t>projeto</a:t>
             </a:r>
             <a:r>
@@ -3781,9 +3789,12 @@
             </a:r>
             <a:r>
               <a:rPr lang="en-US" sz="3091" dirty="0"/>
-              <a:t> 45fl-200142)</a:t>
-            </a:r>
-            <a:endParaRPr lang="en-US" sz="3091" dirty="0" smtClean="0"/>
+              <a:t> 45fl-200142</a:t>
+            </a:r>
+            <a:r>
+              <a:rPr lang="en-US" sz="3091" dirty="0" smtClean="0"/>
+              <a:t>).</a:t>
+            </a:r>
           </a:p>
         </p:txBody>
       </p:sp>
@@ -4080,10 +4091,10 @@
           <a:lstStyle/>
           <a:p>
             <a:r>
-              <a:rPr lang="en-US" sz="2378" b="1" u="sng" dirty="0" err="1" smtClean="0"/>
+              <a:rPr lang="en-US" sz="2378" b="1" dirty="0" err="1" smtClean="0"/>
               <a:t>Referências</a:t>
             </a:r>
-            <a:endParaRPr lang="en-US" sz="1664" u="sng" dirty="0"/>
+            <a:endParaRPr lang="en-US" sz="1664" dirty="0"/>
           </a:p>
           <a:p>
             <a:pPr marL="285750" indent="-285750">
@@ -4091,28 +4102,28 @@
               <a:buChar char="•"/>
             </a:pPr>
             <a:r>
-              <a:rPr lang="en-US" sz="1660" u="sng" dirty="0" err="1"/>
+              <a:rPr lang="en-US" sz="1660" dirty="0" err="1"/>
               <a:t>AtmelTM</a:t>
             </a:r>
             <a:r>
-              <a:rPr lang="en-US" sz="1660" u="sng" dirty="0"/>
+              <a:rPr lang="en-US" sz="1660" dirty="0"/>
               <a:t>, 2008. Application note, AVR194: Brushless DC Motor Control using ATmega32M1,</a:t>
             </a:r>
           </a:p>
           <a:p>
             <a:r>
-              <a:rPr lang="pt-BR" sz="1660" u="sng" dirty="0" smtClean="0"/>
+              <a:rPr lang="pt-BR" sz="1660" dirty="0" smtClean="0"/>
               <a:t>      &lt;</a:t>
             </a:r>
             <a:r>
-              <a:rPr lang="pt-BR" sz="1660" u="sng" dirty="0"/>
+              <a:rPr lang="pt-BR" sz="1660" dirty="0"/>
               <a:t>https://www.maxonmotor.com/maxon/view/product/200142</a:t>
             </a:r>
             <a:r>
-              <a:rPr lang="pt-BR" sz="1660" u="sng" dirty="0" smtClean="0"/>
+              <a:rPr lang="pt-BR" sz="1660" dirty="0" smtClean="0"/>
               <a:t>&gt;.</a:t>
             </a:r>
-            <a:endParaRPr lang="pt-BR" sz="1660" u="sng" dirty="0"/>
+            <a:endParaRPr lang="pt-BR" sz="1660" dirty="0"/>
           </a:p>
           <a:p>
             <a:pPr marL="285750" indent="-285750">
@@ -4120,78 +4131,78 @@
               <a:buChar char="•"/>
             </a:pPr>
             <a:r>
-              <a:rPr lang="pt-BR" sz="1660" u="sng" dirty="0" err="1"/>
+              <a:rPr lang="pt-BR" sz="1660" dirty="0" err="1"/>
               <a:t>Baldursson</a:t>
             </a:r>
             <a:r>
-              <a:rPr lang="pt-BR" sz="1660" u="sng" dirty="0"/>
+              <a:rPr lang="pt-BR" sz="1660" dirty="0"/>
               <a:t>, S., 2005. BLDC Motor </a:t>
             </a:r>
             <a:r>
-              <a:rPr lang="pt-BR" sz="1660" u="sng" dirty="0" err="1"/>
+              <a:rPr lang="pt-BR" sz="1660" dirty="0" err="1"/>
               <a:t>Modelling</a:t>
             </a:r>
             <a:r>
-              <a:rPr lang="pt-BR" sz="1660" u="sng" dirty="0"/>
+              <a:rPr lang="pt-BR" sz="1660" dirty="0"/>
               <a:t> </a:t>
             </a:r>
             <a:r>
-              <a:rPr lang="pt-BR" sz="1660" u="sng" dirty="0" err="1"/>
+              <a:rPr lang="pt-BR" sz="1660" dirty="0" err="1"/>
               <a:t>and</a:t>
             </a:r>
             <a:r>
-              <a:rPr lang="pt-BR" sz="1660" u="sng" dirty="0"/>
+              <a:rPr lang="pt-BR" sz="1660" dirty="0"/>
               <a:t> </a:t>
             </a:r>
             <a:r>
-              <a:rPr lang="pt-BR" sz="1660" u="sng" dirty="0" err="1"/>
+              <a:rPr lang="pt-BR" sz="1660" dirty="0" err="1"/>
               <a:t>Control</a:t>
             </a:r>
             <a:r>
-              <a:rPr lang="pt-BR" sz="1660" u="sng" dirty="0"/>
+              <a:rPr lang="pt-BR" sz="1660" dirty="0"/>
               <a:t> – A </a:t>
             </a:r>
             <a:r>
-              <a:rPr lang="pt-BR" sz="1660" u="sng" dirty="0" err="1"/>
+              <a:rPr lang="pt-BR" sz="1660" dirty="0" err="1"/>
               <a:t>MatlabTM</a:t>
             </a:r>
             <a:r>
-              <a:rPr lang="pt-BR" sz="1660" u="sng" dirty="0"/>
+              <a:rPr lang="pt-BR" sz="1660" dirty="0"/>
               <a:t> /</a:t>
             </a:r>
             <a:r>
-              <a:rPr lang="pt-BR" sz="1660" u="sng" dirty="0" err="1"/>
+              <a:rPr lang="pt-BR" sz="1660" dirty="0" err="1"/>
               <a:t>SimulinkTM</a:t>
             </a:r>
             <a:r>
-              <a:rPr lang="pt-BR" sz="1660" u="sng" dirty="0"/>
+              <a:rPr lang="pt-BR" sz="1660" dirty="0"/>
               <a:t> </a:t>
             </a:r>
             <a:r>
-              <a:rPr lang="pt-BR" sz="1660" u="sng" dirty="0" err="1"/>
+              <a:rPr lang="pt-BR" sz="1660" dirty="0" err="1"/>
               <a:t>Implementation</a:t>
             </a:r>
             <a:r>
-              <a:rPr lang="pt-BR" sz="1660" u="sng" dirty="0"/>
+              <a:rPr lang="pt-BR" sz="1660" dirty="0"/>
               <a:t>. Dissertação </a:t>
             </a:r>
             <a:r>
-              <a:rPr lang="pt-BR" sz="1660" u="sng" dirty="0" smtClean="0"/>
+              <a:rPr lang="pt-BR" sz="1660" dirty="0" smtClean="0"/>
               <a:t>de </a:t>
             </a:r>
             <a:r>
-              <a:rPr lang="sv-SE" sz="1660" u="sng" dirty="0" smtClean="0"/>
+              <a:rPr lang="sv-SE" sz="1660" dirty="0" smtClean="0"/>
               <a:t>mestrado</a:t>
             </a:r>
             <a:r>
-              <a:rPr lang="sv-SE" sz="1660" u="sng" dirty="0"/>
+              <a:rPr lang="sv-SE" sz="1660" dirty="0"/>
               <a:t>, Institutionen för Energi och Miljö</a:t>
             </a:r>
             <a:r>
-              <a:rPr lang="sv-SE" sz="1660" u="sng" dirty="0" smtClean="0"/>
+              <a:rPr lang="sv-SE" sz="1660" dirty="0" smtClean="0"/>
               <a:t>.</a:t>
             </a:r>
-            <a:endParaRPr lang="sv-SE" sz="1660" u="sng" dirty="0"/>
+            <a:endParaRPr lang="sv-SE" sz="1660" dirty="0"/>
           </a:p>
           <a:p>
             <a:pPr marL="285750" indent="-285750">
@@ -4199,22 +4210,22 @@
               <a:buChar char="•"/>
             </a:pPr>
             <a:r>
-              <a:rPr lang="en-US" sz="1660" u="sng" dirty="0"/>
+              <a:rPr lang="en-US" sz="1660" dirty="0"/>
               <a:t>Committee, S.S.L.T., 2017. Laws of the </a:t>
             </a:r>
             <a:r>
-              <a:rPr lang="en-US" sz="1660" u="sng" dirty="0" err="1"/>
+              <a:rPr lang="en-US" sz="1660" dirty="0" err="1"/>
               <a:t>RoboCup</a:t>
             </a:r>
             <a:r>
-              <a:rPr lang="en-US" sz="1660" u="sng" dirty="0"/>
+              <a:rPr lang="en-US" sz="1660" dirty="0"/>
               <a:t> Small Size League 2017</a:t>
             </a:r>
             <a:r>
-              <a:rPr lang="en-US" sz="1660" u="sng" dirty="0" smtClean="0"/>
+              <a:rPr lang="en-US" sz="1660" dirty="0" smtClean="0"/>
               <a:t>.</a:t>
             </a:r>
-            <a:endParaRPr lang="en-US" sz="1660" u="sng" dirty="0"/>
+            <a:endParaRPr lang="en-US" sz="1660" dirty="0"/>
           </a:p>
           <a:p>
             <a:pPr marL="285750" indent="-285750">
@@ -4222,78 +4233,78 @@
               <a:buChar char="•"/>
             </a:pPr>
             <a:r>
-              <a:rPr lang="pt-BR" sz="1660" u="sng" dirty="0" err="1"/>
+              <a:rPr lang="pt-BR" sz="1660" dirty="0" err="1"/>
               <a:t>Lertariyasakchai</a:t>
             </a:r>
             <a:r>
-              <a:rPr lang="pt-BR" sz="1660" u="sng" dirty="0"/>
+              <a:rPr lang="pt-BR" sz="1660" dirty="0"/>
               <a:t>, P., </a:t>
             </a:r>
             <a:r>
-              <a:rPr lang="pt-BR" sz="1660" u="sng" dirty="0" err="1"/>
+              <a:rPr lang="pt-BR" sz="1660" dirty="0" err="1"/>
               <a:t>Panyapiang</a:t>
             </a:r>
             <a:r>
-              <a:rPr lang="pt-BR" sz="1660" u="sng" dirty="0"/>
+              <a:rPr lang="pt-BR" sz="1660" dirty="0"/>
               <a:t>, T., </a:t>
             </a:r>
             <a:r>
-              <a:rPr lang="pt-BR" sz="1660" u="sng" dirty="0" err="1"/>
+              <a:rPr lang="pt-BR" sz="1660" dirty="0" err="1"/>
               <a:t>Chaiso</a:t>
             </a:r>
             <a:r>
-              <a:rPr lang="pt-BR" sz="1660" u="sng" dirty="0"/>
+              <a:rPr lang="pt-BR" sz="1660" dirty="0"/>
               <a:t>, K. </a:t>
             </a:r>
             <a:r>
-              <a:rPr lang="pt-BR" sz="1660" u="sng" dirty="0" err="1"/>
+              <a:rPr lang="pt-BR" sz="1660" dirty="0" err="1"/>
               <a:t>and</a:t>
             </a:r>
             <a:r>
-              <a:rPr lang="pt-BR" sz="1660" u="sng" dirty="0"/>
+              <a:rPr lang="pt-BR" sz="1660" dirty="0"/>
               <a:t> </a:t>
             </a:r>
             <a:r>
-              <a:rPr lang="pt-BR" sz="1660" u="sng" dirty="0" err="1"/>
+              <a:rPr lang="pt-BR" sz="1660" dirty="0" err="1"/>
               <a:t>Sukvichai</a:t>
             </a:r>
             <a:r>
-              <a:rPr lang="pt-BR" sz="1660" u="sng" dirty="0"/>
+              <a:rPr lang="pt-BR" sz="1660" dirty="0"/>
               <a:t>, K., 2012. “Skuba 2012 </a:t>
             </a:r>
             <a:r>
-              <a:rPr lang="pt-BR" sz="1660" u="sng" dirty="0" err="1"/>
+              <a:rPr lang="pt-BR" sz="1660" dirty="0" err="1"/>
               <a:t>team</a:t>
             </a:r>
             <a:r>
-              <a:rPr lang="pt-BR" sz="1660" u="sng" dirty="0"/>
+              <a:rPr lang="pt-BR" sz="1660" dirty="0"/>
               <a:t> </a:t>
             </a:r>
             <a:r>
-              <a:rPr lang="pt-BR" sz="1660" u="sng" dirty="0" err="1"/>
+              <a:rPr lang="pt-BR" sz="1660" dirty="0" err="1"/>
               <a:t>description</a:t>
             </a:r>
             <a:r>
-              <a:rPr lang="pt-BR" sz="1660" u="sng" dirty="0" smtClean="0"/>
+              <a:rPr lang="pt-BR" sz="1660" dirty="0" smtClean="0"/>
               <a:t>”. </a:t>
             </a:r>
             <a:r>
-              <a:rPr lang="pt-BR" sz="1660" u="sng" dirty="0" err="1" smtClean="0"/>
+              <a:rPr lang="pt-BR" sz="1660" dirty="0" err="1" smtClean="0"/>
               <a:t>Robocup</a:t>
             </a:r>
             <a:r>
-              <a:rPr lang="pt-BR" sz="1660" u="sng" dirty="0" smtClean="0"/>
+              <a:rPr lang="pt-BR" sz="1660" dirty="0" smtClean="0"/>
               <a:t> TDP, Vol</a:t>
             </a:r>
             <a:r>
-              <a:rPr lang="pt-BR" sz="1660" u="sng" dirty="0"/>
+              <a:rPr lang="pt-BR" sz="1660" dirty="0"/>
               <a:t>. 1</a:t>
             </a:r>
             <a:r>
-              <a:rPr lang="pt-BR" sz="1660" u="sng" dirty="0" smtClean="0"/>
+              <a:rPr lang="pt-BR" sz="1660" dirty="0" smtClean="0"/>
               <a:t>.</a:t>
             </a:r>
-            <a:endParaRPr lang="pt-BR" sz="1660" u="sng" dirty="0"/>
+            <a:endParaRPr lang="pt-BR" sz="1660" dirty="0"/>
           </a:p>
           <a:p>
             <a:pPr marL="285750" indent="-285750">
@@ -4301,30 +4312,30 @@
               <a:buChar char="•"/>
             </a:pPr>
             <a:r>
-              <a:rPr lang="en-US" sz="1660" u="sng" dirty="0"/>
+              <a:rPr lang="en-US" sz="1660" dirty="0"/>
               <a:t>MATLAB, 2017. “</a:t>
             </a:r>
             <a:r>
-              <a:rPr lang="en-US" sz="1660" u="sng" dirty="0" err="1"/>
+              <a:rPr lang="en-US" sz="1660" dirty="0" err="1"/>
               <a:t>Matlab</a:t>
             </a:r>
             <a:r>
-              <a:rPr lang="en-US" sz="1660" u="sng" dirty="0"/>
+              <a:rPr lang="en-US" sz="1660" dirty="0"/>
               <a:t>”. The </a:t>
             </a:r>
             <a:r>
-              <a:rPr lang="en-US" sz="1660" u="sng" dirty="0" err="1"/>
+              <a:rPr lang="en-US" sz="1660" dirty="0" err="1"/>
               <a:t>MathWorks</a:t>
             </a:r>
             <a:r>
-              <a:rPr lang="en-US" sz="1660" u="sng" dirty="0"/>
+              <a:rPr lang="en-US" sz="1660" dirty="0"/>
               <a:t>, Natick, MA, USA</a:t>
             </a:r>
             <a:r>
-              <a:rPr lang="en-US" sz="1660" u="sng" dirty="0" smtClean="0"/>
+              <a:rPr lang="en-US" sz="1660" dirty="0" smtClean="0"/>
               <a:t>.</a:t>
             </a:r>
-            <a:endParaRPr lang="en-US" sz="1660" u="sng" dirty="0"/>
+            <a:endParaRPr lang="en-US" sz="1660" dirty="0"/>
           </a:p>
           <a:p>
             <a:pPr marL="285750" indent="-285750">
@@ -4332,39 +4343,39 @@
               <a:buChar char="•"/>
             </a:pPr>
             <a:r>
-              <a:rPr lang="pt-BR" sz="1660" u="sng" dirty="0" err="1"/>
+              <a:rPr lang="pt-BR" sz="1660" dirty="0" err="1"/>
               <a:t>Maxon</a:t>
             </a:r>
             <a:r>
-              <a:rPr lang="pt-BR" sz="1660" u="sng" dirty="0"/>
+              <a:rPr lang="pt-BR" sz="1660" dirty="0"/>
               <a:t>, 2017. </a:t>
             </a:r>
             <a:r>
-              <a:rPr lang="pt-BR" sz="1660" u="sng" dirty="0" err="1"/>
+              <a:rPr lang="pt-BR" sz="1660" dirty="0" err="1"/>
               <a:t>Datasheet</a:t>
             </a:r>
             <a:r>
-              <a:rPr lang="pt-BR" sz="1660" u="sng" dirty="0"/>
+              <a:rPr lang="pt-BR" sz="1660" dirty="0"/>
               <a:t>, </a:t>
             </a:r>
             <a:r>
-              <a:rPr lang="pt-BR" sz="1660" u="sng" dirty="0" err="1"/>
+              <a:rPr lang="pt-BR" sz="1660" dirty="0" err="1"/>
               <a:t>Maxon</a:t>
             </a:r>
             <a:r>
-              <a:rPr lang="pt-BR" sz="1660" u="sng" dirty="0"/>
+              <a:rPr lang="pt-BR" sz="1660" dirty="0"/>
               <a:t> </a:t>
             </a:r>
             <a:r>
-              <a:rPr lang="pt-BR" sz="1660" u="sng" dirty="0" err="1"/>
+              <a:rPr lang="pt-BR" sz="1660" dirty="0" err="1"/>
               <a:t>MotorTM</a:t>
             </a:r>
             <a:r>
-              <a:rPr lang="pt-BR" sz="1660" u="sng" dirty="0" smtClean="0"/>
+              <a:rPr lang="pt-BR" sz="1660" dirty="0" smtClean="0"/>
               <a:t>, &lt;</a:t>
             </a:r>
             <a:r>
-              <a:rPr lang="pt-BR" sz="1660" u="sng" dirty="0"/>
+              <a:rPr lang="pt-BR" sz="1660" dirty="0"/>
               <a:t>https://www.maxonmotor.com/maxon/view/product/200142&gt;.</a:t>
             </a:r>
           </a:p>
@@ -4374,19 +4385,19 @@
               <a:buChar char="•"/>
             </a:pPr>
             <a:r>
-              <a:rPr lang="pt-BR" sz="1660" u="sng" dirty="0" err="1"/>
+              <a:rPr lang="pt-BR" sz="1660" dirty="0" err="1"/>
               <a:t>Ogata</a:t>
             </a:r>
             <a:r>
-              <a:rPr lang="pt-BR" sz="1660" u="sng" dirty="0"/>
+              <a:rPr lang="pt-BR" sz="1660" dirty="0"/>
               <a:t>, K., 1982. Engenharia de controle moderno. Pearson Prentice Hall, 4th </a:t>
             </a:r>
             <a:r>
-              <a:rPr lang="pt-BR" sz="1660" u="sng" dirty="0" err="1"/>
+              <a:rPr lang="pt-BR" sz="1660" dirty="0" err="1"/>
               <a:t>edition</a:t>
             </a:r>
             <a:r>
-              <a:rPr lang="pt-BR" sz="1660" u="sng" dirty="0"/>
+              <a:rPr lang="pt-BR" sz="1660" dirty="0"/>
               <a:t>. ISBN 9788587918239.</a:t>
             </a:r>
           </a:p>
@@ -4396,7 +4407,7 @@
               <a:buChar char="•"/>
             </a:pPr>
             <a:r>
-              <a:rPr lang="en-US" sz="1660" u="sng" dirty="0"/>
+              <a:rPr lang="en-US" sz="1660" dirty="0"/>
               <a:t>Sen, P.C., 1989. Principles of Electric Machines and Power Electronics. Wiley, 3rd edition.</a:t>
             </a:r>
           </a:p>
@@ -4406,19 +4417,19 @@
               <a:buChar char="•"/>
             </a:pPr>
             <a:r>
-              <a:rPr lang="en-US" sz="1660" u="sng" dirty="0"/>
+              <a:rPr lang="en-US" sz="1660" dirty="0"/>
               <a:t>Store, E.T., 2017. “Brushless dc motor: Construction, working principle and applications”. Site da Electrical </a:t>
             </a:r>
             <a:r>
-              <a:rPr lang="en-US" sz="1660" u="sng" dirty="0" smtClean="0"/>
+              <a:rPr lang="en-US" sz="1660" dirty="0" smtClean="0"/>
               <a:t>Technology</a:t>
             </a:r>
             <a:r>
-              <a:rPr lang="pt-BR" sz="1660" u="sng" dirty="0" err="1" smtClean="0"/>
+              <a:rPr lang="pt-BR" sz="1660" dirty="0" err="1" smtClean="0"/>
               <a:t>Store</a:t>
             </a:r>
             <a:r>
-              <a:rPr lang="pt-BR" sz="1660" u="sng" dirty="0" smtClean="0"/>
+              <a:rPr lang="pt-BR" sz="1660" dirty="0" smtClean="0"/>
               <a:t>. URL https://www.electricaltechnology.org/.</a:t>
             </a:r>
           </a:p>
@@ -4428,22 +4439,22 @@
               <a:buChar char="•"/>
             </a:pPr>
             <a:r>
-              <a:rPr lang="en-US" sz="1660" u="sng" dirty="0" err="1" smtClean="0"/>
+              <a:rPr lang="en-US" sz="1660" dirty="0" err="1" smtClean="0"/>
               <a:t>Yedamale</a:t>
             </a:r>
             <a:r>
-              <a:rPr lang="en-US" sz="1660" u="sng" dirty="0"/>
+              <a:rPr lang="en-US" sz="1660" dirty="0"/>
               <a:t>, P., 2003. “Brushless dc (</a:t>
             </a:r>
             <a:r>
-              <a:rPr lang="en-US" sz="1660" u="sng" dirty="0" err="1"/>
+              <a:rPr lang="en-US" sz="1660" dirty="0" err="1"/>
               <a:t>bldc</a:t>
             </a:r>
             <a:r>
-              <a:rPr lang="en-US" sz="1660" u="sng" dirty="0"/>
+              <a:rPr lang="en-US" sz="1660" dirty="0"/>
               <a:t>) motor fundamentals”. Microchip Technology Inc., Vol. 1.</a:t>
             </a:r>
-            <a:endParaRPr lang="en-US" sz="1660" u="sng" dirty="0" smtClean="0"/>
+            <a:endParaRPr lang="en-US" sz="1660" dirty="0" smtClean="0"/>
           </a:p>
           <a:p>
             <a:endParaRPr lang="pt-BR" sz="1664" u="sng" dirty="0"/>

</xml_diff>